<commit_message>
Doc and PPT changes
</commit_message>
<xml_diff>
--- a/Build2/Project Build 2 – Team 19.pptx
+++ b/Build2/Project Build 2 – Team 19.pptx
@@ -242,7 +242,7 @@
           <a:p>
             <a:fld id="{7487ADD9-2083-264C-A652-8D52D02F7E72}" type="datetimeFigureOut">
               <a:rPr lang="en-US" smtClean="0"/>
-              <a:t>3/16/2024</a:t>
+              <a:t>3/17/2024</a:t>
             </a:fld>
             <a:endParaRPr lang="en-US" dirty="0"/>
           </a:p>
@@ -553,16 +553,6 @@
           <a:bodyPr/>
           <a:lstStyle/>
           <a:p>
-            <a:r>
-              <a:rPr lang="en-US" dirty="0"/>
-              <a:t>Hello, we are team 19 and we will be demonstrating our build 1 today.</a:t>
-            </a:r>
-          </a:p>
-          <a:p>
-            <a:r>
-              <a:rPr lang="en-US" dirty="0"/>
-              <a:t>Our team consist of 5 members, names and id are mentioned on the slide.</a:t>
-            </a:r>
             <a:endParaRPr lang="en-CA" dirty="0"/>
           </a:p>
         </p:txBody>
@@ -2776,7 +2766,7 @@
           <a:p>
             <a:fld id="{AE46C21D-EBB5-4F3D-B06D-166777189317}" type="datetime1">
               <a:rPr lang="en-US" smtClean="0"/>
-              <a:t>3/16/2024</a:t>
+              <a:t>3/17/2024</a:t>
             </a:fld>
             <a:endParaRPr lang="en-US" dirty="0"/>
           </a:p>
@@ -3660,7 +3650,7 @@
           <a:p>
             <a:fld id="{1DFFEA26-EB1D-498C-95CD-1ECE586790AA}" type="datetime1">
               <a:rPr lang="en-US" smtClean="0"/>
-              <a:t>3/16/2024</a:t>
+              <a:t>3/17/2024</a:t>
             </a:fld>
             <a:endParaRPr lang="en-US" dirty="0"/>
           </a:p>
@@ -4836,7 +4826,7 @@
           <a:p>
             <a:fld id="{539842EE-D56F-4F18-94E7-094CEF23F906}" type="datetime1">
               <a:rPr lang="en-US" smtClean="0"/>
-              <a:t>3/16/2024</a:t>
+              <a:t>3/17/2024</a:t>
             </a:fld>
             <a:endParaRPr lang="en-US" dirty="0"/>
           </a:p>
@@ -6915,7 +6905,7 @@
           <a:p>
             <a:fld id="{45B08281-154C-4FEF-A6DF-18BA3AC0F374}" type="datetime1">
               <a:rPr lang="en-US" smtClean="0"/>
-              <a:t>3/16/2024</a:t>
+              <a:t>3/17/2024</a:t>
             </a:fld>
             <a:endParaRPr lang="en-US" dirty="0"/>
           </a:p>
@@ -7632,7 +7622,7 @@
           <a:p>
             <a:fld id="{04D857D4-BD7E-4A06-844B-AAD504F1114F}" type="datetime1">
               <a:rPr lang="en-US" smtClean="0"/>
-              <a:t>3/16/2024</a:t>
+              <a:t>3/17/2024</a:t>
             </a:fld>
             <a:endParaRPr lang="en-US" dirty="0"/>
           </a:p>
@@ -8859,7 +8849,7 @@
           <a:p>
             <a:fld id="{916AFA50-87A4-4E99-B112-8C6B1DFB84B2}" type="datetime1">
               <a:rPr lang="en-US" smtClean="0"/>
-              <a:t>3/16/2024</a:t>
+              <a:t>3/17/2024</a:t>
             </a:fld>
             <a:endParaRPr lang="en-US" dirty="0"/>
           </a:p>
@@ -9450,7 +9440,7 @@
           <a:p>
             <a:fld id="{6B3905CA-BF0F-4A1B-AA0D-85E42F5D5A85}" type="datetime1">
               <a:rPr lang="en-US" smtClean="0"/>
-              <a:t>3/16/2024</a:t>
+              <a:t>3/17/2024</a:t>
             </a:fld>
             <a:endParaRPr lang="en-US" dirty="0"/>
           </a:p>
@@ -9922,7 +9912,7 @@
           <a:p>
             <a:fld id="{D3DA9A77-60C0-4BB8-898D-2828EE4073AD}" type="datetime1">
               <a:rPr lang="en-US" smtClean="0"/>
-              <a:t>3/16/2024</a:t>
+              <a:t>3/17/2024</a:t>
             </a:fld>
             <a:endParaRPr lang="en-US" dirty="0"/>
           </a:p>
@@ -10771,7 +10761,7 @@
           <a:p>
             <a:fld id="{C1F30CD5-42B1-4614-9F46-5D29928CC2DB}" type="datetime1">
               <a:rPr lang="en-US" smtClean="0"/>
-              <a:t>3/16/2024</a:t>
+              <a:t>3/17/2024</a:t>
             </a:fld>
             <a:endParaRPr lang="en-US" dirty="0"/>
           </a:p>
@@ -12995,7 +12985,7 @@
           <a:p>
             <a:fld id="{EE6020E3-D95B-4E55-964F-4B1A98BDAA6F}" type="datetime1">
               <a:rPr lang="en-US" smtClean="0"/>
-              <a:t>3/16/2024</a:t>
+              <a:t>3/17/2024</a:t>
             </a:fld>
             <a:endParaRPr lang="en-US" dirty="0"/>
           </a:p>
@@ -13263,7 +13253,7 @@
           <a:p>
             <a:fld id="{FC9A72C8-1C87-42EF-8A11-BF6DFA19ED8B}" type="datetime1">
               <a:rPr lang="en-US" smtClean="0"/>
-              <a:t>3/16/2024</a:t>
+              <a:t>3/17/2024</a:t>
             </a:fld>
             <a:endParaRPr lang="en-US" dirty="0"/>
           </a:p>
@@ -14654,7 +14644,7 @@
           <a:p>
             <a:r>
               <a:rPr lang="en-US" dirty="0"/>
-              <a:t>5) Null pointer exceptions were removed during the refactoring phase. These were removed by introducing a specific syntax for. equals method all throughout our project.</a:t>
+              <a:t>5) Null pointer exceptions were removed during the refactoring phase. These were removed by introducing a specific syntax for equals method all throughout our project.</a:t>
             </a:r>
           </a:p>
           <a:p>
@@ -14693,14 +14683,9 @@
           </a:bodyPr>
           <a:lstStyle/>
           <a:p>
-            <a:pPr>
-              <a:spcAft>
-                <a:spcPts val="600"/>
-              </a:spcAft>
-            </a:pPr>
-            <a:r>
-              <a:rPr lang="en-US"/>
-              <a:t>PRESENTATION TITLE</a:t>
+            <a:r>
+              <a:rPr lang="en-US" dirty="0"/>
+              <a:t>Advanced Programming Practices (SOEN 6441) – Team 19</a:t>
             </a:r>
           </a:p>
         </p:txBody>
@@ -14751,6 +14736,36 @@
           </a:p>
         </p:txBody>
       </p:sp>
+      <p:pic>
+        <p:nvPicPr>
+          <p:cNvPr id="7" name="Picture 6">
+            <a:extLst>
+              <a:ext uri="{FF2B5EF4-FFF2-40B4-BE49-F238E27FC236}">
+                <a16:creationId xmlns:a16="http://schemas.microsoft.com/office/drawing/2014/main" id="{A2FF993A-0DD6-C681-AE08-F4EC0F2EFBF1}"/>
+              </a:ext>
+            </a:extLst>
+          </p:cNvPr>
+          <p:cNvPicPr>
+            <a:picLocks noChangeAspect="1"/>
+          </p:cNvPicPr>
+          <p:nvPr/>
+        </p:nvPicPr>
+        <p:blipFill>
+          <a:blip r:embed="rId2"/>
+          <a:stretch>
+            <a:fillRect/>
+          </a:stretch>
+        </p:blipFill>
+        <p:spPr>
+          <a:xfrm>
+            <a:off x="2455701" y="3770969"/>
+            <a:ext cx="6315956" cy="1819529"/>
+          </a:xfrm>
+          <a:prstGeom prst="rect">
+            <a:avLst/>
+          </a:prstGeom>
+        </p:spPr>
+      </p:pic>
     </p:spTree>
     <p:extLst>
       <p:ext uri="{BB962C8B-B14F-4D97-AF65-F5344CB8AC3E}">
@@ -17462,10 +17477,9 @@
           <a:lstStyle/>
           <a:p>
             <a:r>
-              <a:rPr lang="en-US"/>
-              <a:t>PRESENTATION TITLE</a:t>
-            </a:r>
-            <a:endParaRPr lang="en-US" dirty="0"/>
+              <a:rPr lang="en-US" dirty="0"/>
+              <a:t>Advanced Programming Practices (SOEN 6441) – Team 19</a:t>
+            </a:r>
           </a:p>
         </p:txBody>
       </p:sp>
@@ -17758,39 +17772,6 @@
       </p:sp>
       <p:sp>
         <p:nvSpPr>
-          <p:cNvPr id="4" name="Footer Placeholder 3">
-            <a:extLst>
-              <a:ext uri="{FF2B5EF4-FFF2-40B4-BE49-F238E27FC236}">
-                <a16:creationId xmlns:a16="http://schemas.microsoft.com/office/drawing/2014/main" id="{CC9F5520-7D74-92D7-E86E-AF3EB0A3C94D}"/>
-              </a:ext>
-            </a:extLst>
-          </p:cNvPr>
-          <p:cNvSpPr>
-            <a:spLocks noGrp="1"/>
-          </p:cNvSpPr>
-          <p:nvPr>
-            <p:ph type="ftr" sz="quarter" idx="4294967295"/>
-          </p:nvPr>
-        </p:nvSpPr>
-        <p:spPr>
-          <a:xfrm>
-            <a:off x="0" y="6356350"/>
-            <a:ext cx="4114800" cy="365125"/>
-          </a:xfrm>
-        </p:spPr>
-        <p:txBody>
-          <a:bodyPr/>
-          <a:lstStyle/>
-          <a:p>
-            <a:r>
-              <a:rPr lang="en-US" dirty="0"/>
-              <a:t>Advanced Programming Practices (SOEN 6441) – Team 19</a:t>
-            </a:r>
-          </a:p>
-        </p:txBody>
-      </p:sp>
-      <p:sp>
-        <p:nvSpPr>
           <p:cNvPr id="5" name="Slide Number Placeholder 4">
             <a:extLst>
               <a:ext uri="{FF2B5EF4-FFF2-40B4-BE49-F238E27FC236}">
@@ -17906,7 +17887,7 @@
           <a:p>
             <a:r>
               <a:rPr lang="en-US" dirty="0"/>
-              <a:t>Project Build 1 – Team 19</a:t>
+              <a:t>Project Build 2 – Team 19</a:t>
             </a:r>
           </a:p>
         </p:txBody>
@@ -19167,10 +19148,10 @@
       </p:sp>
       <p:pic>
         <p:nvPicPr>
-          <p:cNvPr id="7" name="Picture 6">
-            <a:extLst>
-              <a:ext uri="{FF2B5EF4-FFF2-40B4-BE49-F238E27FC236}">
-                <a16:creationId xmlns:a16="http://schemas.microsoft.com/office/drawing/2014/main" id="{8AE3C3E8-22A6-C3F5-16B8-0E8A694F1EFB}"/>
+          <p:cNvPr id="6" name="Picture 5" descr="A screen shot of a computer code&#10;&#10;Description automatically generated">
+            <a:extLst>
+              <a:ext uri="{FF2B5EF4-FFF2-40B4-BE49-F238E27FC236}">
+                <a16:creationId xmlns:a16="http://schemas.microsoft.com/office/drawing/2014/main" id="{686FE06D-3355-6280-492D-C98A658C49F5}"/>
               </a:ext>
             </a:extLst>
           </p:cNvPr>
@@ -19187,13 +19168,12 @@
         </p:blipFill>
         <p:spPr>
           <a:xfrm>
-            <a:off x="6152334" y="2628141"/>
-            <a:ext cx="4794341" cy="2145467"/>
+            <a:off x="5931879" y="2508726"/>
+            <a:ext cx="5943600" cy="1522730"/>
           </a:xfrm>
           <a:prstGeom prst="rect">
             <a:avLst/>
           </a:prstGeom>
-          <a:noFill/>
         </p:spPr>
       </p:pic>
     </p:spTree>
@@ -19394,10 +19374,10 @@
       </p:sp>
       <p:pic>
         <p:nvPicPr>
-          <p:cNvPr id="6" name="Picture 5" descr="A screenshot of a video game&#10;&#10;Description automatically generated">
-            <a:extLst>
-              <a:ext uri="{FF2B5EF4-FFF2-40B4-BE49-F238E27FC236}">
-                <a16:creationId xmlns:a16="http://schemas.microsoft.com/office/drawing/2014/main" id="{E51771C7-7850-F089-4899-0302DBE11469}"/>
+          <p:cNvPr id="9" name="Picture 8">
+            <a:extLst>
+              <a:ext uri="{FF2B5EF4-FFF2-40B4-BE49-F238E27FC236}">
+                <a16:creationId xmlns:a16="http://schemas.microsoft.com/office/drawing/2014/main" id="{5263A8CA-5B50-237E-D5B8-3B818B08BEE9}"/>
               </a:ext>
             </a:extLst>
           </p:cNvPr>
@@ -19407,34 +19387,27 @@
           <p:nvPr/>
         </p:nvPicPr>
         <p:blipFill>
-          <a:blip r:embed="rId2">
-            <a:extLst>
-              <a:ext uri="{28A0092B-C50C-407E-A947-70E740481C1C}">
-                <a14:useLocalDpi xmlns:a14="http://schemas.microsoft.com/office/drawing/2010/main" val="0"/>
-              </a:ext>
-            </a:extLst>
-          </a:blip>
+          <a:blip r:embed="rId2"/>
           <a:stretch>
             <a:fillRect/>
           </a:stretch>
         </p:blipFill>
         <p:spPr>
           <a:xfrm>
-            <a:off x="5783436" y="2115685"/>
-            <a:ext cx="5615498" cy="1530222"/>
+            <a:off x="1343903" y="2427972"/>
+            <a:ext cx="4263123" cy="3827867"/>
           </a:xfrm>
           <a:prstGeom prst="rect">
             <a:avLst/>
           </a:prstGeom>
-          <a:noFill/>
         </p:spPr>
       </p:pic>
       <p:pic>
         <p:nvPicPr>
-          <p:cNvPr id="7" name="Picture 6" descr="A computer screen shot of a computer code&#10;&#10;Description automatically generated">
-            <a:extLst>
-              <a:ext uri="{FF2B5EF4-FFF2-40B4-BE49-F238E27FC236}">
-                <a16:creationId xmlns:a16="http://schemas.microsoft.com/office/drawing/2014/main" id="{CBC414D6-FA4A-5266-3164-6A2B841332FA}"/>
+          <p:cNvPr id="11" name="Picture 10">
+            <a:extLst>
+              <a:ext uri="{FF2B5EF4-FFF2-40B4-BE49-F238E27FC236}">
+                <a16:creationId xmlns:a16="http://schemas.microsoft.com/office/drawing/2014/main" id="{C93FF047-ADFA-1833-C62D-567CB3F9D837}"/>
               </a:ext>
             </a:extLst>
           </p:cNvPr>
@@ -19444,21 +19417,15 @@
           <p:nvPr/>
         </p:nvPicPr>
         <p:blipFill>
-          <a:blip r:embed="rId3">
-            <a:extLst>
-              <a:ext uri="{28A0092B-C50C-407E-A947-70E740481C1C}">
-                <a14:useLocalDpi xmlns:a14="http://schemas.microsoft.com/office/drawing/2010/main" val="0"/>
-              </a:ext>
-            </a:extLst>
-          </a:blip>
+          <a:blip r:embed="rId3"/>
           <a:stretch>
             <a:fillRect/>
           </a:stretch>
         </p:blipFill>
         <p:spPr>
           <a:xfrm>
-            <a:off x="1018532" y="3706073"/>
-            <a:ext cx="5514975" cy="2620645"/>
+            <a:off x="5783436" y="2381104"/>
+            <a:ext cx="5877745" cy="2095792"/>
           </a:xfrm>
           <a:prstGeom prst="rect">
             <a:avLst/>
@@ -19871,14 +19838,9 @@
           </a:bodyPr>
           <a:lstStyle/>
           <a:p>
-            <a:pPr>
-              <a:spcAft>
-                <a:spcPts val="600"/>
-              </a:spcAft>
-            </a:pPr>
-            <a:r>
-              <a:rPr lang="en-US"/>
-              <a:t>PRESENTATION TITLE</a:t>
+            <a:r>
+              <a:rPr lang="en-US" dirty="0"/>
+              <a:t>Advanced Programming Practices (SOEN 6441) – Team 19</a:t>
             </a:r>
           </a:p>
         </p:txBody>
@@ -20495,6 +20457,15 @@
 </file>
 
 <file path=customXml/item2.xml><?xml version="1.0" encoding="utf-8"?>
+<?mso-contentType ?>
+<FormTemplates xmlns="http://schemas.microsoft.com/sharepoint/v3/contenttype/forms">
+  <Display>DocumentLibraryForm</Display>
+  <Edit>DocumentLibraryForm</Edit>
+  <New>DocumentLibraryForm</New>
+</FormTemplates>
+</file>
+
+<file path=customXml/item3.xml><?xml version="1.0" encoding="utf-8"?>
 <ct:contentTypeSchema xmlns:ct="http://schemas.microsoft.com/office/2006/metadata/contentType" xmlns:ma="http://schemas.microsoft.com/office/2006/metadata/properties/metaAttributes" ct:_="" ma:_="" ma:contentTypeName="Document" ma:contentTypeID="0x01010079F111ED35F8CC479449609E8A0923A6" ma:contentTypeVersion="28" ma:contentTypeDescription="Create a new document." ma:contentTypeScope="" ma:versionID="60f5a4f2d2b0abadcf532d48ebf9cb71">
   <xsd:schema xmlns:xsd="http://www.w3.org/2001/XMLSchema" xmlns:xs="http://www.w3.org/2001/XMLSchema" xmlns:p="http://schemas.microsoft.com/office/2006/metadata/properties" xmlns:ns1="http://schemas.microsoft.com/sharepoint/v3" xmlns:ns2="71af3243-3dd4-4a8d-8c0d-dd76da1f02a5" xmlns:ns3="16c05727-aa75-4e4a-9b5f-8a80a1165891" xmlns:ns4="230e9df3-be65-4c73-a93b-d1236ebd677e" targetNamespace="http://schemas.microsoft.com/office/2006/metadata/properties" ma:root="true" ma:fieldsID="7dd78129e6a1811f84807ad11c651531" ns1:_="" ns2:_="" ns3:_="" ns4:_="">
     <xsd:import namespace="http://schemas.microsoft.com/sharepoint/v3"/>
@@ -20806,15 +20777,6 @@
 </ct:contentTypeSchema>
 </file>
 
-<file path=customXml/item3.xml><?xml version="1.0" encoding="utf-8"?>
-<?mso-contentType ?>
-<FormTemplates xmlns="http://schemas.microsoft.com/sharepoint/v3/contenttype/forms">
-  <Display>DocumentLibraryForm</Display>
-  <Edit>DocumentLibraryForm</Edit>
-  <New>DocumentLibraryForm</New>
-</FormTemplates>
-</file>
-
 <file path=customXml/itemProps1.xml><?xml version="1.0" encoding="utf-8"?>
 <ds:datastoreItem xmlns:ds="http://schemas.openxmlformats.org/officeDocument/2006/customXml" ds:itemID="{1342FAFE-88B4-49B4-9588-86CB0E564E50}">
   <ds:schemaRefs>
@@ -20828,6 +20790,14 @@
 </file>
 
 <file path=customXml/itemProps2.xml><?xml version="1.0" encoding="utf-8"?>
+<ds:datastoreItem xmlns:ds="http://schemas.openxmlformats.org/officeDocument/2006/customXml" ds:itemID="{42076B5C-85B0-4D30-852D-5E5312EEA93B}">
+  <ds:schemaRefs>
+    <ds:schemaRef ds:uri="http://schemas.microsoft.com/sharepoint/v3/contenttype/forms"/>
+  </ds:schemaRefs>
+</ds:datastoreItem>
+</file>
+
+<file path=customXml/itemProps3.xml><?xml version="1.0" encoding="utf-8"?>
 <ds:datastoreItem xmlns:ds="http://schemas.openxmlformats.org/officeDocument/2006/customXml" ds:itemID="{81C465B7-820B-4DEA-AB4B-5167C1BE9075}">
   <ds:schemaRefs>
     <ds:schemaRef ds:uri="http://schemas.microsoft.com/office/2006/metadata/contentType"/>
@@ -20848,14 +20818,6 @@
 </ds:datastoreItem>
 </file>
 
-<file path=customXml/itemProps3.xml><?xml version="1.0" encoding="utf-8"?>
-<ds:datastoreItem xmlns:ds="http://schemas.openxmlformats.org/officeDocument/2006/customXml" ds:itemID="{42076B5C-85B0-4D30-852D-5E5312EEA93B}">
-  <ds:schemaRefs>
-    <ds:schemaRef ds:uri="http://schemas.microsoft.com/sharepoint/v3/contenttype/forms"/>
-  </ds:schemaRefs>
-</ds:datastoreItem>
-</file>
-
 <file path=docMetadata/LabelInfo.xml><?xml version="1.0" encoding="utf-8"?>
 <clbl:labelList xmlns:clbl="http://schemas.microsoft.com/office/2020/mipLabelMetadata"/>
 </file>
</xml_diff>